<commit_message>
Ejemplos java implementacion y tipos de datos
</commit_message>
<xml_diff>
--- a/CAPACITACION WEB FV.pptx
+++ b/CAPACITACION WEB FV.pptx
@@ -121,7 +121,7 @@
   </p:defaultTextStyle>
   <p:extLst>
     <p:ext uri="{EFAFB233-063F-42B5-8137-9DF3F51BA10A}">
-      <p15:sldGuideLst xmlns:p15="http://schemas.microsoft.com/office/powerpoint/2012/main">
+      <p15:sldGuideLst xmlns:p15="http://schemas.microsoft.com/office/powerpoint/2012/main" xmlns="">
         <p15:guide id="1" orient="horz" pos="2160">
           <p15:clr>
             <a:srgbClr val="A4A3A4"/>
@@ -220,7 +220,7 @@
           <a:p>
             <a:fld id="{22C305BF-3C47-46BF-8FB7-1F322CC9A8C6}" type="datetimeFigureOut">
               <a:rPr lang="es-EC" smtClean="0"/>
-              <a:t>14/10/2018</a:t>
+              <a:t>19/10/2018</a:t>
             </a:fld>
             <a:endParaRPr lang="es-EC"/>
           </a:p>
@@ -379,7 +379,7 @@
           <a:p>
             <a:fld id="{AF34B137-3AA3-4526-87F1-C86AE912BD02}" type="slidenum">
               <a:rPr lang="es-EC" smtClean="0"/>
-              <a:t>‹#›</a:t>
+              <a:t>‹Nº›</a:t>
             </a:fld>
             <a:endParaRPr lang="es-EC"/>
           </a:p>
@@ -707,7 +707,7 @@
           <a:p>
             <a:fld id="{6DDB7E7C-AE19-4CAD-872A-C96A550A8BB1}" type="datetimeFigureOut">
               <a:rPr lang="es-EC" smtClean="0"/>
-              <a:t>14/10/2018</a:t>
+              <a:t>19/10/2018</a:t>
             </a:fld>
             <a:endParaRPr lang="es-EC"/>
           </a:p>
@@ -771,7 +771,7 @@
           <a:p>
             <a:fld id="{E57FAF9D-CD1B-47C5-96B8-A3C678550043}" type="slidenum">
               <a:rPr lang="es-EC" smtClean="0"/>
-              <a:t>‹#›</a:t>
+              <a:t>‹Nº›</a:t>
             </a:fld>
             <a:endParaRPr lang="es-EC"/>
           </a:p>
@@ -894,7 +894,7 @@
           <a:p>
             <a:fld id="{6DDB7E7C-AE19-4CAD-872A-C96A550A8BB1}" type="datetimeFigureOut">
               <a:rPr lang="es-EC" smtClean="0"/>
-              <a:t>14/10/2018</a:t>
+              <a:t>19/10/2018</a:t>
             </a:fld>
             <a:endParaRPr lang="es-EC"/>
           </a:p>
@@ -936,7 +936,7 @@
           <a:p>
             <a:fld id="{E57FAF9D-CD1B-47C5-96B8-A3C678550043}" type="slidenum">
               <a:rPr lang="es-EC" smtClean="0"/>
-              <a:t>‹#›</a:t>
+              <a:t>‹Nº›</a:t>
             </a:fld>
             <a:endParaRPr lang="es-EC"/>
           </a:p>
@@ -1069,7 +1069,7 @@
           <a:p>
             <a:fld id="{6DDB7E7C-AE19-4CAD-872A-C96A550A8BB1}" type="datetimeFigureOut">
               <a:rPr lang="es-EC" smtClean="0"/>
-              <a:t>14/10/2018</a:t>
+              <a:t>19/10/2018</a:t>
             </a:fld>
             <a:endParaRPr lang="es-EC"/>
           </a:p>
@@ -1111,7 +1111,7 @@
           <a:p>
             <a:fld id="{E57FAF9D-CD1B-47C5-96B8-A3C678550043}" type="slidenum">
               <a:rPr lang="es-EC" smtClean="0"/>
-              <a:t>‹#›</a:t>
+              <a:t>‹Nº›</a:t>
             </a:fld>
             <a:endParaRPr lang="es-EC"/>
           </a:p>
@@ -1249,7 +1249,7 @@
           <a:p>
             <a:fld id="{6DDB7E7C-AE19-4CAD-872A-C96A550A8BB1}" type="datetimeFigureOut">
               <a:rPr lang="es-EC" smtClean="0"/>
-              <a:t>14/10/2018</a:t>
+              <a:t>19/10/2018</a:t>
             </a:fld>
             <a:endParaRPr lang="es-EC"/>
           </a:p>
@@ -1296,7 +1296,7 @@
           <a:p>
             <a:fld id="{E57FAF9D-CD1B-47C5-96B8-A3C678550043}" type="slidenum">
               <a:rPr lang="es-EC" smtClean="0"/>
-              <a:t>‹#›</a:t>
+              <a:t>‹Nº›</a:t>
             </a:fld>
             <a:endParaRPr lang="es-EC"/>
           </a:p>
@@ -1496,7 +1496,7 @@
           <a:p>
             <a:fld id="{6DDB7E7C-AE19-4CAD-872A-C96A550A8BB1}" type="datetimeFigureOut">
               <a:rPr lang="es-EC" smtClean="0"/>
-              <a:t>14/10/2018</a:t>
+              <a:t>19/10/2018</a:t>
             </a:fld>
             <a:endParaRPr lang="es-EC"/>
           </a:p>
@@ -1548,7 +1548,7 @@
           <a:p>
             <a:fld id="{E57FAF9D-CD1B-47C5-96B8-A3C678550043}" type="slidenum">
               <a:rPr lang="es-EC" smtClean="0"/>
-              <a:t>‹#›</a:t>
+              <a:t>‹Nº›</a:t>
             </a:fld>
             <a:endParaRPr lang="es-EC"/>
           </a:p>
@@ -1970,7 +1970,7 @@
           <a:p>
             <a:fld id="{6DDB7E7C-AE19-4CAD-872A-C96A550A8BB1}" type="datetimeFigureOut">
               <a:rPr lang="es-EC" smtClean="0"/>
-              <a:t>14/10/2018</a:t>
+              <a:t>19/10/2018</a:t>
             </a:fld>
             <a:endParaRPr lang="es-EC"/>
           </a:p>
@@ -2022,7 +2022,7 @@
           <a:p>
             <a:fld id="{E57FAF9D-CD1B-47C5-96B8-A3C678550043}" type="slidenum">
               <a:rPr lang="es-EC" smtClean="0"/>
-              <a:t>‹#›</a:t>
+              <a:t>‹Nº›</a:t>
             </a:fld>
             <a:endParaRPr lang="es-EC"/>
           </a:p>
@@ -2385,7 +2385,7 @@
           <a:p>
             <a:fld id="{6DDB7E7C-AE19-4CAD-872A-C96A550A8BB1}" type="datetimeFigureOut">
               <a:rPr lang="es-EC" smtClean="0"/>
-              <a:t>14/10/2018</a:t>
+              <a:t>19/10/2018</a:t>
             </a:fld>
             <a:endParaRPr lang="es-EC"/>
           </a:p>
@@ -2441,7 +2441,7 @@
           <a:p>
             <a:fld id="{E57FAF9D-CD1B-47C5-96B8-A3C678550043}" type="slidenum">
               <a:rPr lang="es-EC" smtClean="0"/>
-              <a:t>‹#›</a:t>
+              <a:t>‹Nº›</a:t>
             </a:fld>
             <a:endParaRPr lang="es-EC"/>
           </a:p>
@@ -2516,7 +2516,7 @@
           <a:p>
             <a:fld id="{6DDB7E7C-AE19-4CAD-872A-C96A550A8BB1}" type="datetimeFigureOut">
               <a:rPr lang="es-EC" smtClean="0"/>
-              <a:t>14/10/2018</a:t>
+              <a:t>19/10/2018</a:t>
             </a:fld>
             <a:endParaRPr lang="es-EC"/>
           </a:p>
@@ -2558,7 +2558,7 @@
           <a:p>
             <a:fld id="{E57FAF9D-CD1B-47C5-96B8-A3C678550043}" type="slidenum">
               <a:rPr lang="es-EC" smtClean="0"/>
-              <a:t>‹#›</a:t>
+              <a:t>‹Nº›</a:t>
             </a:fld>
             <a:endParaRPr lang="es-EC"/>
           </a:p>
@@ -2611,7 +2611,7 @@
           <a:p>
             <a:fld id="{6DDB7E7C-AE19-4CAD-872A-C96A550A8BB1}" type="datetimeFigureOut">
               <a:rPr lang="es-EC" smtClean="0"/>
-              <a:t>14/10/2018</a:t>
+              <a:t>19/10/2018</a:t>
             </a:fld>
             <a:endParaRPr lang="es-EC"/>
           </a:p>
@@ -2663,7 +2663,7 @@
           <a:p>
             <a:fld id="{E57FAF9D-CD1B-47C5-96B8-A3C678550043}" type="slidenum">
               <a:rPr lang="es-EC" smtClean="0"/>
-              <a:t>‹#›</a:t>
+              <a:t>‹Nº›</a:t>
             </a:fld>
             <a:endParaRPr lang="es-EC"/>
           </a:p>
@@ -2889,7 +2889,7 @@
           <a:p>
             <a:fld id="{6DDB7E7C-AE19-4CAD-872A-C96A550A8BB1}" type="datetimeFigureOut">
               <a:rPr lang="es-EC" smtClean="0"/>
-              <a:t>14/10/2018</a:t>
+              <a:t>19/10/2018</a:t>
             </a:fld>
             <a:endParaRPr lang="es-EC"/>
           </a:p>
@@ -2949,7 +2949,7 @@
           <a:p>
             <a:fld id="{E57FAF9D-CD1B-47C5-96B8-A3C678550043}" type="slidenum">
               <a:rPr lang="es-EC" smtClean="0"/>
-              <a:t>‹#›</a:t>
+              <a:t>‹Nº›</a:t>
             </a:fld>
             <a:endParaRPr lang="es-EC"/>
           </a:p>
@@ -3141,7 +3141,7 @@
           <a:p>
             <a:fld id="{6DDB7E7C-AE19-4CAD-872A-C96A550A8BB1}" type="datetimeFigureOut">
               <a:rPr lang="es-EC" smtClean="0"/>
-              <a:t>14/10/2018</a:t>
+              <a:t>19/10/2018</a:t>
             </a:fld>
             <a:endParaRPr lang="es-EC"/>
           </a:p>
@@ -3201,7 +3201,7 @@
           <a:p>
             <a:fld id="{E57FAF9D-CD1B-47C5-96B8-A3C678550043}" type="slidenum">
               <a:rPr lang="es-EC" smtClean="0"/>
-              <a:t>‹#›</a:t>
+              <a:t>‹Nº›</a:t>
             </a:fld>
             <a:endParaRPr lang="es-EC"/>
           </a:p>
@@ -3513,7 +3513,7 @@
           <a:p>
             <a:fld id="{6DDB7E7C-AE19-4CAD-872A-C96A550A8BB1}" type="datetimeFigureOut">
               <a:rPr lang="es-EC" smtClean="0"/>
-              <a:t>14/10/2018</a:t>
+              <a:t>19/10/2018</a:t>
             </a:fld>
             <a:endParaRPr lang="es-EC"/>
           </a:p>
@@ -3587,7 +3587,7 @@
           <a:p>
             <a:fld id="{E57FAF9D-CD1B-47C5-96B8-A3C678550043}" type="slidenum">
               <a:rPr lang="es-EC" smtClean="0"/>
-              <a:t>‹#›</a:t>
+              <a:t>‹Nº›</a:t>
             </a:fld>
             <a:endParaRPr lang="es-EC"/>
           </a:p>
@@ -4197,6 +4197,13 @@
   <p:clrMapOvr>
     <a:masterClrMapping/>
   </p:clrMapOvr>
+  <p:timing>
+    <p:tnLst>
+      <p:par>
+        <p:cTn id="1" dur="indefinite" restart="never" nodeType="tmRoot"/>
+      </p:par>
+    </p:tnLst>
+  </p:timing>
 </p:sld>
 </file>
 
@@ -4352,6 +4359,13 @@
   <p:clrMapOvr>
     <a:masterClrMapping/>
   </p:clrMapOvr>
+  <p:timing>
+    <p:tnLst>
+      <p:par>
+        <p:cTn id="1" dur="indefinite" restart="never" nodeType="tmRoot"/>
+      </p:par>
+    </p:tnLst>
+  </p:timing>
 </p:sld>
 </file>
 
@@ -4473,68 +4487,6 @@
             <a:r>
               <a:rPr lang="es-EC" dirty="0"/>
               <a:t>REBASE</a:t>
-            </a:r>
-          </a:p>
-        </p:txBody>
-      </p:sp>
-      <p:sp>
-        <p:nvSpPr>
-          <p:cNvPr id="4" name="1 Título"/>
-          <p:cNvSpPr txBox="1">
-            <a:spLocks/>
-          </p:cNvSpPr>
-          <p:nvPr/>
-        </p:nvSpPr>
-        <p:spPr>
-          <a:xfrm>
-            <a:off x="457200" y="548680"/>
-            <a:ext cx="8229600" cy="1117846"/>
-          </a:xfrm>
-          <a:prstGeom prst="rect">
-            <a:avLst/>
-          </a:prstGeom>
-        </p:spPr>
-        <p:txBody>
-          <a:bodyPr vert="horz" anchor="ctr">
-            <a:normAutofit/>
-          </a:bodyPr>
-          <a:lstStyle>
-            <a:lvl1pPr marL="484632" algn="l" rtl="0" eaLnBrk="1" latinLnBrk="0" hangingPunct="1">
-              <a:spcBef>
-                <a:spcPct val="0"/>
-              </a:spcBef>
-              <a:buNone/>
-              <a:defRPr kumimoji="0" sz="4200" kern="1200">
-                <a:ln w="6350">
-                  <a:solidFill>
-                    <a:schemeClr val="accent1">
-                      <a:shade val="43000"/>
-                    </a:schemeClr>
-                  </a:solidFill>
-                </a:ln>
-                <a:solidFill>
-                  <a:schemeClr val="accent1">
-                    <a:tint val="83000"/>
-                    <a:satMod val="150000"/>
-                  </a:schemeClr>
-                </a:solidFill>
-                <a:effectLst>
-                  <a:outerShdw blurRad="26000" dist="26000" dir="14500000" algn="tl" rotWithShape="0">
-                    <a:srgbClr val="000000">
-                      <a:alpha val="40000"/>
-                    </a:srgbClr>
-                  </a:outerShdw>
-                </a:effectLst>
-                <a:latin typeface="+mj-lt"/>
-                <a:ea typeface="+mj-ea"/>
-                <a:cs typeface="+mj-cs"/>
-              </a:defRPr>
-            </a:lvl1pPr>
-          </a:lstStyle>
-          <a:p>
-            <a:r>
-              <a:rPr lang="es-EC" dirty="0"/>
-              <a:t>1.1 GIT</a:t>
             </a:r>
           </a:p>
         </p:txBody>
@@ -4880,6 +4832,13 @@
   <p:clrMapOvr>
     <a:masterClrMapping/>
   </p:clrMapOvr>
+  <p:timing>
+    <p:tnLst>
+      <p:par>
+        <p:cTn id="1" dur="indefinite" restart="never" nodeType="tmRoot"/>
+      </p:par>
+    </p:tnLst>
+  </p:timing>
 </p:sld>
 </file>
 
@@ -4980,6 +4939,13 @@
   <p:clrMapOvr>
     <a:masterClrMapping/>
   </p:clrMapOvr>
+  <p:timing>
+    <p:tnLst>
+      <p:par>
+        <p:cTn id="1" dur="indefinite" restart="never" nodeType="tmRoot"/>
+      </p:par>
+    </p:tnLst>
+  </p:timing>
 </p:sld>
 </file>
 
@@ -6898,7 +6864,7 @@
           <p:cNvPr id="2" name="Title 1">
             <a:extLst>
               <a:ext uri="{FF2B5EF4-FFF2-40B4-BE49-F238E27FC236}">
-                <a16:creationId xmlns:a16="http://schemas.microsoft.com/office/drawing/2014/main" id="{9E07F87C-EF91-42B3-AF12-7736B2F9D604}"/>
+                <a16:creationId xmlns:a16="http://schemas.microsoft.com/office/drawing/2014/main" xmlns="" id="{9E07F87C-EF91-42B3-AF12-7736B2F9D604}"/>
               </a:ext>
             </a:extLst>
           </p:cNvPr>
@@ -6926,7 +6892,7 @@
           <p:cNvPr id="3" name="Content Placeholder 2">
             <a:extLst>
               <a:ext uri="{FF2B5EF4-FFF2-40B4-BE49-F238E27FC236}">
-                <a16:creationId xmlns:a16="http://schemas.microsoft.com/office/drawing/2014/main" id="{CA1EBF06-6A8A-4804-959C-704C47AAF032}"/>
+                <a16:creationId xmlns:a16="http://schemas.microsoft.com/office/drawing/2014/main" xmlns="" id="{CA1EBF06-6A8A-4804-959C-704C47AAF032}"/>
               </a:ext>
             </a:extLst>
           </p:cNvPr>
@@ -6962,7 +6928,7 @@
           <p:cNvPr id="6" name="Picture 5">
             <a:extLst>
               <a:ext uri="{FF2B5EF4-FFF2-40B4-BE49-F238E27FC236}">
-                <a16:creationId xmlns:a16="http://schemas.microsoft.com/office/drawing/2014/main" id="{065B9B82-6503-4139-B5A9-32E0471B2FA4}"/>
+                <a16:creationId xmlns:a16="http://schemas.microsoft.com/office/drawing/2014/main" xmlns="" id="{065B9B82-6503-4139-B5A9-32E0471B2FA4}"/>
               </a:ext>
             </a:extLst>
           </p:cNvPr>
@@ -6992,7 +6958,7 @@
           <p:cNvPr id="7" name="TextBox 6">
             <a:extLst>
               <a:ext uri="{FF2B5EF4-FFF2-40B4-BE49-F238E27FC236}">
-                <a16:creationId xmlns:a16="http://schemas.microsoft.com/office/drawing/2014/main" id="{22537B7D-E8E6-4382-AFA5-4046EE18B9F8}"/>
+                <a16:creationId xmlns:a16="http://schemas.microsoft.com/office/drawing/2014/main" xmlns="" id="{22537B7D-E8E6-4382-AFA5-4046EE18B9F8}"/>
               </a:ext>
             </a:extLst>
           </p:cNvPr>

</xml_diff>